<commit_message>
Made and exported graphs for lesson 7.
</commit_message>
<xml_diff>
--- a/graphs.pptx
+++ b/graphs.pptx
@@ -7,6 +7,8 @@
   <p:sldIdLst>
     <p:sldId id="257" r:id="rId2"/>
     <p:sldId id="258" r:id="rId3"/>
+    <p:sldId id="260" r:id="rId4"/>
+    <p:sldId id="259" r:id="rId5"/>
   </p:sldIdLst>
   <p:sldSz cx="14400213" cy="14400213"/>
   <p:notesSz cx="6858000" cy="9144000"/>
@@ -244,7 +246,7 @@
           <a:p>
             <a:fld id="{46201475-00EE-432B-B48C-35E49C3BE552}" type="datetimeFigureOut">
               <a:rPr lang="en-CA" smtClean="0"/>
-              <a:t>2019-09-19</a:t>
+              <a:t>2019-09-20</a:t>
             </a:fld>
             <a:endParaRPr lang="en-CA"/>
           </a:p>
@@ -414,7 +416,7 @@
           <a:p>
             <a:fld id="{46201475-00EE-432B-B48C-35E49C3BE552}" type="datetimeFigureOut">
               <a:rPr lang="en-CA" smtClean="0"/>
-              <a:t>2019-09-19</a:t>
+              <a:t>2019-09-20</a:t>
             </a:fld>
             <a:endParaRPr lang="en-CA"/>
           </a:p>
@@ -594,7 +596,7 @@
           <a:p>
             <a:fld id="{46201475-00EE-432B-B48C-35E49C3BE552}" type="datetimeFigureOut">
               <a:rPr lang="en-CA" smtClean="0"/>
-              <a:t>2019-09-19</a:t>
+              <a:t>2019-09-20</a:t>
             </a:fld>
             <a:endParaRPr lang="en-CA"/>
           </a:p>
@@ -764,7 +766,7 @@
           <a:p>
             <a:fld id="{46201475-00EE-432B-B48C-35E49C3BE552}" type="datetimeFigureOut">
               <a:rPr lang="en-CA" smtClean="0"/>
-              <a:t>2019-09-19</a:t>
+              <a:t>2019-09-20</a:t>
             </a:fld>
             <a:endParaRPr lang="en-CA"/>
           </a:p>
@@ -1008,7 +1010,7 @@
           <a:p>
             <a:fld id="{46201475-00EE-432B-B48C-35E49C3BE552}" type="datetimeFigureOut">
               <a:rPr lang="en-CA" smtClean="0"/>
-              <a:t>2019-09-19</a:t>
+              <a:t>2019-09-20</a:t>
             </a:fld>
             <a:endParaRPr lang="en-CA"/>
           </a:p>
@@ -1240,7 +1242,7 @@
           <a:p>
             <a:fld id="{46201475-00EE-432B-B48C-35E49C3BE552}" type="datetimeFigureOut">
               <a:rPr lang="en-CA" smtClean="0"/>
-              <a:t>2019-09-19</a:t>
+              <a:t>2019-09-20</a:t>
             </a:fld>
             <a:endParaRPr lang="en-CA"/>
           </a:p>
@@ -1607,7 +1609,7 @@
           <a:p>
             <a:fld id="{46201475-00EE-432B-B48C-35E49C3BE552}" type="datetimeFigureOut">
               <a:rPr lang="en-CA" smtClean="0"/>
-              <a:t>2019-09-19</a:t>
+              <a:t>2019-09-20</a:t>
             </a:fld>
             <a:endParaRPr lang="en-CA"/>
           </a:p>
@@ -1725,7 +1727,7 @@
           <a:p>
             <a:fld id="{46201475-00EE-432B-B48C-35E49C3BE552}" type="datetimeFigureOut">
               <a:rPr lang="en-CA" smtClean="0"/>
-              <a:t>2019-09-19</a:t>
+              <a:t>2019-09-20</a:t>
             </a:fld>
             <a:endParaRPr lang="en-CA"/>
           </a:p>
@@ -1820,7 +1822,7 @@
           <a:p>
             <a:fld id="{46201475-00EE-432B-B48C-35E49C3BE552}" type="datetimeFigureOut">
               <a:rPr lang="en-CA" smtClean="0"/>
-              <a:t>2019-09-19</a:t>
+              <a:t>2019-09-20</a:t>
             </a:fld>
             <a:endParaRPr lang="en-CA"/>
           </a:p>
@@ -2097,7 +2099,7 @@
           <a:p>
             <a:fld id="{46201475-00EE-432B-B48C-35E49C3BE552}" type="datetimeFigureOut">
               <a:rPr lang="en-CA" smtClean="0"/>
-              <a:t>2019-09-19</a:t>
+              <a:t>2019-09-20</a:t>
             </a:fld>
             <a:endParaRPr lang="en-CA"/>
           </a:p>
@@ -2354,7 +2356,7 @@
           <a:p>
             <a:fld id="{46201475-00EE-432B-B48C-35E49C3BE552}" type="datetimeFigureOut">
               <a:rPr lang="en-CA" smtClean="0"/>
-              <a:t>2019-09-19</a:t>
+              <a:t>2019-09-20</a:t>
             </a:fld>
             <a:endParaRPr lang="en-CA"/>
           </a:p>
@@ -2567,7 +2569,7 @@
           <a:p>
             <a:fld id="{46201475-00EE-432B-B48C-35E49C3BE552}" type="datetimeFigureOut">
               <a:rPr lang="en-CA" smtClean="0"/>
-              <a:t>2019-09-19</a:t>
+              <a:t>2019-09-20</a:t>
             </a:fld>
             <a:endParaRPr lang="en-CA"/>
           </a:p>
@@ -5986,6 +5988,2443 @@
 </p:sld>
 </file>
 
+<file path=ppt/slides/slide3.xml><?xml version="1.0" encoding="utf-8"?>
+<p:sld xmlns:a="http://schemas.openxmlformats.org/drawingml/2006/main" xmlns:r="http://schemas.openxmlformats.org/officeDocument/2006/relationships" xmlns:p="http://schemas.openxmlformats.org/presentationml/2006/main">
+  <p:cSld>
+    <p:spTree>
+      <p:nvGrpSpPr>
+        <p:cNvPr id="1" name=""/>
+        <p:cNvGrpSpPr/>
+        <p:nvPr/>
+      </p:nvGrpSpPr>
+      <p:grpSpPr>
+        <a:xfrm>
+          <a:off x="0" y="0"/>
+          <a:ext cx="0" cy="0"/>
+          <a:chOff x="0" y="0"/>
+          <a:chExt cx="0" cy="0"/>
+        </a:xfrm>
+      </p:grpSpPr>
+      <p:grpSp>
+        <p:nvGrpSpPr>
+          <p:cNvPr id="3" name="Group 2">
+            <a:extLst>
+              <a:ext uri="{FF2B5EF4-FFF2-40B4-BE49-F238E27FC236}">
+                <a16:creationId xmlns:a16="http://schemas.microsoft.com/office/drawing/2014/main" id="{28F59173-0BCF-45DC-A041-A8DBEFDB2913}"/>
+              </a:ext>
+            </a:extLst>
+          </p:cNvPr>
+          <p:cNvGrpSpPr/>
+          <p:nvPr/>
+        </p:nvGrpSpPr>
+        <p:grpSpPr>
+          <a:xfrm>
+            <a:off x="1283224" y="6029917"/>
+            <a:ext cx="9711887" cy="4457855"/>
+            <a:chOff x="1283224" y="6029917"/>
+            <a:chExt cx="9711887" cy="3066805"/>
+          </a:xfrm>
+        </p:grpSpPr>
+        <p:sp>
+          <p:nvSpPr>
+            <p:cNvPr id="42" name="Rectangle 41">
+              <a:extLst>
+                <a:ext uri="{FF2B5EF4-FFF2-40B4-BE49-F238E27FC236}">
+                  <a16:creationId xmlns:a16="http://schemas.microsoft.com/office/drawing/2014/main" id="{C81C75C1-5F67-4C32-B06D-BC18596114F5}"/>
+                </a:ext>
+              </a:extLst>
+            </p:cNvPr>
+            <p:cNvSpPr/>
+            <p:nvPr/>
+          </p:nvSpPr>
+          <p:spPr>
+            <a:xfrm>
+              <a:off x="1721571" y="6029918"/>
+              <a:ext cx="9273540" cy="3066804"/>
+            </a:xfrm>
+            <a:prstGeom prst="rect">
+              <a:avLst/>
+            </a:prstGeom>
+            <a:solidFill>
+              <a:srgbClr val="DAEFC3"/>
+            </a:solidFill>
+            <a:ln>
+              <a:noFill/>
+            </a:ln>
+          </p:spPr>
+          <p:style>
+            <a:lnRef idx="2">
+              <a:schemeClr val="accent1">
+                <a:shade val="50000"/>
+              </a:schemeClr>
+            </a:lnRef>
+            <a:fillRef idx="1">
+              <a:schemeClr val="accent1"/>
+            </a:fillRef>
+            <a:effectRef idx="0">
+              <a:schemeClr val="accent1"/>
+            </a:effectRef>
+            <a:fontRef idx="minor">
+              <a:schemeClr val="lt1"/>
+            </a:fontRef>
+          </p:style>
+          <p:txBody>
+            <a:bodyPr rtlCol="0" anchor="ctr"/>
+            <a:lstStyle/>
+            <a:p>
+              <a:pPr algn="ctr"/>
+              <a:endParaRPr lang="en-CA"/>
+            </a:p>
+          </p:txBody>
+        </p:sp>
+        <p:sp>
+          <p:nvSpPr>
+            <p:cNvPr id="43" name="Rectangle 42">
+              <a:extLst>
+                <a:ext uri="{FF2B5EF4-FFF2-40B4-BE49-F238E27FC236}">
+                  <a16:creationId xmlns:a16="http://schemas.microsoft.com/office/drawing/2014/main" id="{664ACB63-3D39-4D8B-A9E1-3ADE7196600D}"/>
+                </a:ext>
+              </a:extLst>
+            </p:cNvPr>
+            <p:cNvSpPr/>
+            <p:nvPr/>
+          </p:nvSpPr>
+          <p:spPr>
+            <a:xfrm rot="16200000">
+              <a:off x="-23162" y="7336303"/>
+              <a:ext cx="3066804" cy="454031"/>
+            </a:xfrm>
+            <a:prstGeom prst="rect">
+              <a:avLst/>
+            </a:prstGeom>
+            <a:solidFill>
+              <a:srgbClr val="006C31"/>
+            </a:solidFill>
+            <a:ln>
+              <a:noFill/>
+            </a:ln>
+          </p:spPr>
+          <p:style>
+            <a:lnRef idx="2">
+              <a:schemeClr val="accent1">
+                <a:shade val="50000"/>
+              </a:schemeClr>
+            </a:lnRef>
+            <a:fillRef idx="1">
+              <a:schemeClr val="accent1"/>
+            </a:fillRef>
+            <a:effectRef idx="0">
+              <a:schemeClr val="accent1"/>
+            </a:effectRef>
+            <a:fontRef idx="minor">
+              <a:schemeClr val="lt1"/>
+            </a:fontRef>
+          </p:style>
+          <p:txBody>
+            <a:bodyPr rtlCol="0" anchor="ctr"/>
+            <a:lstStyle/>
+            <a:p>
+              <a:pPr algn="ctr"/>
+              <a:r>
+                <a:rPr lang="en-CA" b="1" dirty="0"/>
+                <a:t>Province of Canada</a:t>
+              </a:r>
+            </a:p>
+          </p:txBody>
+        </p:sp>
+      </p:grpSp>
+      <p:cxnSp>
+        <p:nvCxnSpPr>
+          <p:cNvPr id="38" name="Straight Connector 37">
+            <a:extLst>
+              <a:ext uri="{FF2B5EF4-FFF2-40B4-BE49-F238E27FC236}">
+                <a16:creationId xmlns:a16="http://schemas.microsoft.com/office/drawing/2014/main" id="{349712F8-B8D1-4EAC-A074-2199D0A9A302}"/>
+              </a:ext>
+            </a:extLst>
+          </p:cNvPr>
+          <p:cNvCxnSpPr>
+            <a:cxnSpLocks/>
+          </p:cNvCxnSpPr>
+          <p:nvPr/>
+        </p:nvCxnSpPr>
+        <p:spPr>
+          <a:xfrm>
+            <a:off x="2855822" y="9008376"/>
+            <a:ext cx="1" cy="712646"/>
+          </a:xfrm>
+          <a:prstGeom prst="line">
+            <a:avLst/>
+          </a:prstGeom>
+          <a:ln w="57150">
+            <a:solidFill>
+              <a:schemeClr val="bg2">
+                <a:lumMod val="75000"/>
+              </a:schemeClr>
+            </a:solidFill>
+          </a:ln>
+        </p:spPr>
+        <p:style>
+          <a:lnRef idx="1">
+            <a:schemeClr val="accent1"/>
+          </a:lnRef>
+          <a:fillRef idx="0">
+            <a:schemeClr val="accent1"/>
+          </a:fillRef>
+          <a:effectRef idx="0">
+            <a:schemeClr val="accent1"/>
+          </a:effectRef>
+          <a:fontRef idx="minor">
+            <a:schemeClr val="tx1"/>
+          </a:fontRef>
+        </p:style>
+      </p:cxnSp>
+      <p:sp>
+        <p:nvSpPr>
+          <p:cNvPr id="41" name="Rectangle 40">
+            <a:extLst>
+              <a:ext uri="{FF2B5EF4-FFF2-40B4-BE49-F238E27FC236}">
+                <a16:creationId xmlns:a16="http://schemas.microsoft.com/office/drawing/2014/main" id="{A4CB824A-F9DC-4337-9226-F9CF7898C7DE}"/>
+              </a:ext>
+            </a:extLst>
+          </p:cNvPr>
+          <p:cNvSpPr/>
+          <p:nvPr/>
+        </p:nvSpPr>
+        <p:spPr>
+          <a:xfrm>
+            <a:off x="1721571" y="4119112"/>
+            <a:ext cx="9273540" cy="1800725"/>
+          </a:xfrm>
+          <a:prstGeom prst="rect">
+            <a:avLst/>
+          </a:prstGeom>
+          <a:solidFill>
+            <a:srgbClr val="FFC9C9"/>
+          </a:solidFill>
+          <a:ln>
+            <a:noFill/>
+          </a:ln>
+        </p:spPr>
+        <p:style>
+          <a:lnRef idx="2">
+            <a:schemeClr val="accent1">
+              <a:shade val="50000"/>
+            </a:schemeClr>
+          </a:lnRef>
+          <a:fillRef idx="1">
+            <a:schemeClr val="accent1"/>
+          </a:fillRef>
+          <a:effectRef idx="0">
+            <a:schemeClr val="accent1"/>
+          </a:effectRef>
+          <a:fontRef idx="minor">
+            <a:schemeClr val="lt1"/>
+          </a:fontRef>
+        </p:style>
+        <p:txBody>
+          <a:bodyPr rtlCol="0" anchor="ctr"/>
+          <a:lstStyle/>
+          <a:p>
+            <a:pPr algn="ctr"/>
+            <a:endParaRPr lang="en-CA"/>
+          </a:p>
+        </p:txBody>
+      </p:sp>
+      <p:grpSp>
+        <p:nvGrpSpPr>
+          <p:cNvPr id="68" name="Group 67">
+            <a:extLst>
+              <a:ext uri="{FF2B5EF4-FFF2-40B4-BE49-F238E27FC236}">
+                <a16:creationId xmlns:a16="http://schemas.microsoft.com/office/drawing/2014/main" id="{6D97498A-C3E6-40D4-BB8D-BD8793A0E3B8}"/>
+              </a:ext>
+            </a:extLst>
+          </p:cNvPr>
+          <p:cNvGrpSpPr/>
+          <p:nvPr/>
+        </p:nvGrpSpPr>
+        <p:grpSpPr>
+          <a:xfrm>
+            <a:off x="2954139" y="6836971"/>
+            <a:ext cx="6504385" cy="1805196"/>
+            <a:chOff x="2954139" y="6836971"/>
+            <a:chExt cx="6504385" cy="1805196"/>
+          </a:xfrm>
+        </p:grpSpPr>
+        <p:cxnSp>
+          <p:nvCxnSpPr>
+            <p:cNvPr id="26" name="Straight Connector 25">
+              <a:extLst>
+                <a:ext uri="{FF2B5EF4-FFF2-40B4-BE49-F238E27FC236}">
+                  <a16:creationId xmlns:a16="http://schemas.microsoft.com/office/drawing/2014/main" id="{75D4B146-B37B-453F-BDE6-29DE568E848C}"/>
+                </a:ext>
+              </a:extLst>
+            </p:cNvPr>
+            <p:cNvCxnSpPr>
+              <a:cxnSpLocks/>
+            </p:cNvCxnSpPr>
+            <p:nvPr/>
+          </p:nvCxnSpPr>
+          <p:spPr>
+            <a:xfrm>
+              <a:off x="6358344" y="6836971"/>
+              <a:ext cx="0" cy="469479"/>
+            </a:xfrm>
+            <a:prstGeom prst="line">
+              <a:avLst/>
+            </a:prstGeom>
+            <a:ln w="57150">
+              <a:solidFill>
+                <a:schemeClr val="tx1"/>
+              </a:solidFill>
+            </a:ln>
+          </p:spPr>
+          <p:style>
+            <a:lnRef idx="1">
+              <a:schemeClr val="accent1"/>
+            </a:lnRef>
+            <a:fillRef idx="0">
+              <a:schemeClr val="accent1"/>
+            </a:fillRef>
+            <a:effectRef idx="0">
+              <a:schemeClr val="accent1"/>
+            </a:effectRef>
+            <a:fontRef idx="minor">
+              <a:schemeClr val="tx1"/>
+            </a:fontRef>
+          </p:style>
+        </p:cxnSp>
+        <p:cxnSp>
+          <p:nvCxnSpPr>
+            <p:cNvPr id="52" name="Straight Connector 51">
+              <a:extLst>
+                <a:ext uri="{FF2B5EF4-FFF2-40B4-BE49-F238E27FC236}">
+                  <a16:creationId xmlns:a16="http://schemas.microsoft.com/office/drawing/2014/main" id="{E751E6AF-1ECD-4AEA-9846-0B74414BB407}"/>
+                </a:ext>
+              </a:extLst>
+            </p:cNvPr>
+            <p:cNvCxnSpPr>
+              <a:cxnSpLocks/>
+            </p:cNvCxnSpPr>
+            <p:nvPr/>
+          </p:nvCxnSpPr>
+          <p:spPr>
+            <a:xfrm>
+              <a:off x="4646377" y="7301349"/>
+              <a:ext cx="4812147" cy="0"/>
+            </a:xfrm>
+            <a:prstGeom prst="line">
+              <a:avLst/>
+            </a:prstGeom>
+            <a:ln w="57150">
+              <a:solidFill>
+                <a:schemeClr val="tx1"/>
+              </a:solidFill>
+            </a:ln>
+          </p:spPr>
+          <p:style>
+            <a:lnRef idx="1">
+              <a:schemeClr val="accent1"/>
+            </a:lnRef>
+            <a:fillRef idx="0">
+              <a:schemeClr val="accent1"/>
+            </a:fillRef>
+            <a:effectRef idx="0">
+              <a:schemeClr val="accent1"/>
+            </a:effectRef>
+            <a:fontRef idx="minor">
+              <a:schemeClr val="tx1"/>
+            </a:fontRef>
+          </p:style>
+        </p:cxnSp>
+        <p:cxnSp>
+          <p:nvCxnSpPr>
+            <p:cNvPr id="57" name="Straight Connector 56">
+              <a:extLst>
+                <a:ext uri="{FF2B5EF4-FFF2-40B4-BE49-F238E27FC236}">
+                  <a16:creationId xmlns:a16="http://schemas.microsoft.com/office/drawing/2014/main" id="{E96C8990-6B0A-459B-8BFF-5ECF205024B0}"/>
+                </a:ext>
+              </a:extLst>
+            </p:cNvPr>
+            <p:cNvCxnSpPr>
+              <a:cxnSpLocks/>
+            </p:cNvCxnSpPr>
+            <p:nvPr/>
+          </p:nvCxnSpPr>
+          <p:spPr>
+            <a:xfrm>
+              <a:off x="9437698" y="7273753"/>
+              <a:ext cx="0" cy="1161478"/>
+            </a:xfrm>
+            <a:prstGeom prst="line">
+              <a:avLst/>
+            </a:prstGeom>
+            <a:ln w="57150">
+              <a:solidFill>
+                <a:schemeClr val="tx1"/>
+              </a:solidFill>
+            </a:ln>
+          </p:spPr>
+          <p:style>
+            <a:lnRef idx="1">
+              <a:schemeClr val="accent1"/>
+            </a:lnRef>
+            <a:fillRef idx="0">
+              <a:schemeClr val="accent1"/>
+            </a:fillRef>
+            <a:effectRef idx="0">
+              <a:schemeClr val="accent1"/>
+            </a:effectRef>
+            <a:fontRef idx="minor">
+              <a:schemeClr val="tx1"/>
+            </a:fontRef>
+          </p:style>
+        </p:cxnSp>
+        <p:cxnSp>
+          <p:nvCxnSpPr>
+            <p:cNvPr id="59" name="Straight Connector 58">
+              <a:extLst>
+                <a:ext uri="{FF2B5EF4-FFF2-40B4-BE49-F238E27FC236}">
+                  <a16:creationId xmlns:a16="http://schemas.microsoft.com/office/drawing/2014/main" id="{80143961-88CA-492B-831C-CFA8298062D4}"/>
+                </a:ext>
+              </a:extLst>
+            </p:cNvPr>
+            <p:cNvCxnSpPr>
+              <a:cxnSpLocks/>
+            </p:cNvCxnSpPr>
+            <p:nvPr/>
+          </p:nvCxnSpPr>
+          <p:spPr>
+            <a:xfrm>
+              <a:off x="4670481" y="7301349"/>
+              <a:ext cx="0" cy="682508"/>
+            </a:xfrm>
+            <a:prstGeom prst="line">
+              <a:avLst/>
+            </a:prstGeom>
+            <a:ln w="57150">
+              <a:solidFill>
+                <a:schemeClr val="tx1"/>
+              </a:solidFill>
+            </a:ln>
+          </p:spPr>
+          <p:style>
+            <a:lnRef idx="1">
+              <a:schemeClr val="accent1"/>
+            </a:lnRef>
+            <a:fillRef idx="0">
+              <a:schemeClr val="accent1"/>
+            </a:fillRef>
+            <a:effectRef idx="0">
+              <a:schemeClr val="accent1"/>
+            </a:effectRef>
+            <a:fontRef idx="minor">
+              <a:schemeClr val="tx1"/>
+            </a:fontRef>
+          </p:style>
+        </p:cxnSp>
+        <p:cxnSp>
+          <p:nvCxnSpPr>
+            <p:cNvPr id="60" name="Straight Connector 59">
+              <a:extLst>
+                <a:ext uri="{FF2B5EF4-FFF2-40B4-BE49-F238E27FC236}">
+                  <a16:creationId xmlns:a16="http://schemas.microsoft.com/office/drawing/2014/main" id="{C9BB7F33-6D84-4211-B0B9-37CAADF5C1FD}"/>
+                </a:ext>
+              </a:extLst>
+            </p:cNvPr>
+            <p:cNvCxnSpPr>
+              <a:cxnSpLocks/>
+            </p:cNvCxnSpPr>
+            <p:nvPr/>
+          </p:nvCxnSpPr>
+          <p:spPr>
+            <a:xfrm>
+              <a:off x="2954139" y="7978756"/>
+              <a:ext cx="3412042" cy="0"/>
+            </a:xfrm>
+            <a:prstGeom prst="line">
+              <a:avLst/>
+            </a:prstGeom>
+            <a:ln w="57150">
+              <a:solidFill>
+                <a:schemeClr val="tx1"/>
+              </a:solidFill>
+            </a:ln>
+          </p:spPr>
+          <p:style>
+            <a:lnRef idx="1">
+              <a:schemeClr val="accent1"/>
+            </a:lnRef>
+            <a:fillRef idx="0">
+              <a:schemeClr val="accent1"/>
+            </a:fillRef>
+            <a:effectRef idx="0">
+              <a:schemeClr val="accent1"/>
+            </a:effectRef>
+            <a:fontRef idx="minor">
+              <a:schemeClr val="tx1"/>
+            </a:fontRef>
+          </p:style>
+        </p:cxnSp>
+        <p:cxnSp>
+          <p:nvCxnSpPr>
+            <p:cNvPr id="64" name="Straight Connector 63">
+              <a:extLst>
+                <a:ext uri="{FF2B5EF4-FFF2-40B4-BE49-F238E27FC236}">
+                  <a16:creationId xmlns:a16="http://schemas.microsoft.com/office/drawing/2014/main" id="{32F4D6E2-B8A0-45DD-86CA-8C4C8FB1D714}"/>
+                </a:ext>
+              </a:extLst>
+            </p:cNvPr>
+            <p:cNvCxnSpPr>
+              <a:cxnSpLocks/>
+            </p:cNvCxnSpPr>
+            <p:nvPr/>
+          </p:nvCxnSpPr>
+          <p:spPr>
+            <a:xfrm>
+              <a:off x="6341046" y="7959659"/>
+              <a:ext cx="0" cy="682508"/>
+            </a:xfrm>
+            <a:prstGeom prst="line">
+              <a:avLst/>
+            </a:prstGeom>
+            <a:ln w="57150">
+              <a:solidFill>
+                <a:schemeClr val="tx1"/>
+              </a:solidFill>
+            </a:ln>
+          </p:spPr>
+          <p:style>
+            <a:lnRef idx="1">
+              <a:schemeClr val="accent1"/>
+            </a:lnRef>
+            <a:fillRef idx="0">
+              <a:schemeClr val="accent1"/>
+            </a:fillRef>
+            <a:effectRef idx="0">
+              <a:schemeClr val="accent1"/>
+            </a:effectRef>
+            <a:fontRef idx="minor">
+              <a:schemeClr val="tx1"/>
+            </a:fontRef>
+          </p:style>
+        </p:cxnSp>
+        <p:cxnSp>
+          <p:nvCxnSpPr>
+            <p:cNvPr id="65" name="Straight Connector 64">
+              <a:extLst>
+                <a:ext uri="{FF2B5EF4-FFF2-40B4-BE49-F238E27FC236}">
+                  <a16:creationId xmlns:a16="http://schemas.microsoft.com/office/drawing/2014/main" id="{F01289B6-EB26-4753-8245-B510077FA2BD}"/>
+                </a:ext>
+              </a:extLst>
+            </p:cNvPr>
+            <p:cNvCxnSpPr>
+              <a:cxnSpLocks/>
+            </p:cNvCxnSpPr>
+            <p:nvPr/>
+          </p:nvCxnSpPr>
+          <p:spPr>
+            <a:xfrm>
+              <a:off x="2980226" y="7959659"/>
+              <a:ext cx="0" cy="682508"/>
+            </a:xfrm>
+            <a:prstGeom prst="line">
+              <a:avLst/>
+            </a:prstGeom>
+            <a:ln w="57150">
+              <a:solidFill>
+                <a:schemeClr val="tx1"/>
+              </a:solidFill>
+            </a:ln>
+          </p:spPr>
+          <p:style>
+            <a:lnRef idx="1">
+              <a:schemeClr val="accent1"/>
+            </a:lnRef>
+            <a:fillRef idx="0">
+              <a:schemeClr val="accent1"/>
+            </a:fillRef>
+            <a:effectRef idx="0">
+              <a:schemeClr val="accent1"/>
+            </a:effectRef>
+            <a:fontRef idx="minor">
+              <a:schemeClr val="tx1"/>
+            </a:fontRef>
+          </p:style>
+        </p:cxnSp>
+        <p:sp>
+          <p:nvSpPr>
+            <p:cNvPr id="66" name="Rectangle 65">
+              <a:extLst>
+                <a:ext uri="{FF2B5EF4-FFF2-40B4-BE49-F238E27FC236}">
+                  <a16:creationId xmlns:a16="http://schemas.microsoft.com/office/drawing/2014/main" id="{05BDBE40-86D8-4279-82A9-A58CAB6FFAB5}"/>
+                </a:ext>
+              </a:extLst>
+            </p:cNvPr>
+            <p:cNvSpPr/>
+            <p:nvPr/>
+          </p:nvSpPr>
+          <p:spPr>
+            <a:xfrm>
+              <a:off x="3723228" y="7468329"/>
+              <a:ext cx="1999427" cy="301046"/>
+            </a:xfrm>
+            <a:prstGeom prst="rect">
+              <a:avLst/>
+            </a:prstGeom>
+            <a:solidFill>
+              <a:srgbClr val="DAEFC3"/>
+            </a:solidFill>
+            <a:ln>
+              <a:noFill/>
+            </a:ln>
+          </p:spPr>
+          <p:style>
+            <a:lnRef idx="2">
+              <a:schemeClr val="accent1">
+                <a:shade val="50000"/>
+              </a:schemeClr>
+            </a:lnRef>
+            <a:fillRef idx="1">
+              <a:schemeClr val="accent1"/>
+            </a:fillRef>
+            <a:effectRef idx="0">
+              <a:schemeClr val="accent1"/>
+            </a:effectRef>
+            <a:fontRef idx="minor">
+              <a:schemeClr val="lt1"/>
+            </a:fontRef>
+          </p:style>
+          <p:txBody>
+            <a:bodyPr rtlCol="0" anchor="ctr"/>
+            <a:lstStyle/>
+            <a:p>
+              <a:pPr algn="ctr"/>
+              <a:r>
+                <a:rPr lang="en-CA" dirty="0">
+                  <a:solidFill>
+                    <a:schemeClr val="tx1"/>
+                  </a:solidFill>
+                </a:rPr>
+                <a:t>Legislative Branch</a:t>
+              </a:r>
+            </a:p>
+          </p:txBody>
+        </p:sp>
+      </p:grpSp>
+      <p:grpSp>
+        <p:nvGrpSpPr>
+          <p:cNvPr id="12" name="Group 11">
+            <a:extLst>
+              <a:ext uri="{FF2B5EF4-FFF2-40B4-BE49-F238E27FC236}">
+                <a16:creationId xmlns:a16="http://schemas.microsoft.com/office/drawing/2014/main" id="{D9C57122-2EFC-4EB6-B1D2-86ECE6EF105B}"/>
+              </a:ext>
+            </a:extLst>
+          </p:cNvPr>
+          <p:cNvGrpSpPr/>
+          <p:nvPr/>
+        </p:nvGrpSpPr>
+        <p:grpSpPr>
+          <a:xfrm>
+            <a:off x="1891005" y="8188136"/>
+            <a:ext cx="2659224" cy="908060"/>
+            <a:chOff x="2989943" y="595086"/>
+            <a:chExt cx="4579257" cy="1015998"/>
+          </a:xfrm>
+        </p:grpSpPr>
+        <p:sp>
+          <p:nvSpPr>
+            <p:cNvPr id="13" name="Rectangle 12">
+              <a:extLst>
+                <a:ext uri="{FF2B5EF4-FFF2-40B4-BE49-F238E27FC236}">
+                  <a16:creationId xmlns:a16="http://schemas.microsoft.com/office/drawing/2014/main" id="{5919F35E-CFAA-40DB-880B-C89A0A7B7D09}"/>
+                </a:ext>
+              </a:extLst>
+            </p:cNvPr>
+            <p:cNvSpPr/>
+            <p:nvPr/>
+          </p:nvSpPr>
+          <p:spPr>
+            <a:xfrm>
+              <a:off x="2989943" y="595086"/>
+              <a:ext cx="4579257" cy="508000"/>
+            </a:xfrm>
+            <a:prstGeom prst="rect">
+              <a:avLst/>
+            </a:prstGeom>
+            <a:solidFill>
+              <a:srgbClr val="006C31"/>
+            </a:solidFill>
+            <a:ln>
+              <a:noFill/>
+            </a:ln>
+          </p:spPr>
+          <p:style>
+            <a:lnRef idx="2">
+              <a:schemeClr val="accent1">
+                <a:shade val="50000"/>
+              </a:schemeClr>
+            </a:lnRef>
+            <a:fillRef idx="1">
+              <a:schemeClr val="accent1"/>
+            </a:fillRef>
+            <a:effectRef idx="0">
+              <a:schemeClr val="accent1"/>
+            </a:effectRef>
+            <a:fontRef idx="minor">
+              <a:schemeClr val="lt1"/>
+            </a:fontRef>
+          </p:style>
+          <p:txBody>
+            <a:bodyPr rtlCol="0" anchor="ctr"/>
+            <a:lstStyle/>
+            <a:p>
+              <a:pPr algn="ctr"/>
+              <a:r>
+                <a:rPr lang="en-CA" b="1" dirty="0"/>
+                <a:t>House of Commons (L.A.)</a:t>
+              </a:r>
+            </a:p>
+          </p:txBody>
+        </p:sp>
+        <p:sp>
+          <p:nvSpPr>
+            <p:cNvPr id="14" name="Rectangle 13">
+              <a:extLst>
+                <a:ext uri="{FF2B5EF4-FFF2-40B4-BE49-F238E27FC236}">
+                  <a16:creationId xmlns:a16="http://schemas.microsoft.com/office/drawing/2014/main" id="{B30457A7-2935-492E-AF70-F25B5E11DF23}"/>
+                </a:ext>
+              </a:extLst>
+            </p:cNvPr>
+            <p:cNvSpPr/>
+            <p:nvPr/>
+          </p:nvSpPr>
+          <p:spPr>
+            <a:xfrm>
+              <a:off x="2989943" y="1103086"/>
+              <a:ext cx="4579257" cy="507998"/>
+            </a:xfrm>
+            <a:prstGeom prst="rect">
+              <a:avLst/>
+            </a:prstGeom>
+            <a:solidFill>
+              <a:srgbClr val="A7D971"/>
+            </a:solidFill>
+            <a:ln>
+              <a:noFill/>
+            </a:ln>
+          </p:spPr>
+          <p:style>
+            <a:lnRef idx="2">
+              <a:schemeClr val="accent1">
+                <a:shade val="50000"/>
+              </a:schemeClr>
+            </a:lnRef>
+            <a:fillRef idx="1">
+              <a:schemeClr val="accent1"/>
+            </a:fillRef>
+            <a:effectRef idx="0">
+              <a:schemeClr val="accent1"/>
+            </a:effectRef>
+            <a:fontRef idx="minor">
+              <a:schemeClr val="lt1"/>
+            </a:fontRef>
+          </p:style>
+          <p:txBody>
+            <a:bodyPr rtlCol="0" anchor="ctr"/>
+            <a:lstStyle/>
+            <a:p>
+              <a:pPr algn="ctr"/>
+              <a:r>
+                <a:rPr lang="en-CA" dirty="0"/>
+                <a:t>Propose and vote on bills</a:t>
+              </a:r>
+            </a:p>
+          </p:txBody>
+        </p:sp>
+      </p:grpSp>
+      <p:grpSp>
+        <p:nvGrpSpPr>
+          <p:cNvPr id="15" name="Group 14">
+            <a:extLst>
+              <a:ext uri="{FF2B5EF4-FFF2-40B4-BE49-F238E27FC236}">
+                <a16:creationId xmlns:a16="http://schemas.microsoft.com/office/drawing/2014/main" id="{890D1DCB-D6B4-41C5-BB83-7B3A12D1F0EC}"/>
+              </a:ext>
+            </a:extLst>
+          </p:cNvPr>
+          <p:cNvGrpSpPr/>
+          <p:nvPr/>
+        </p:nvGrpSpPr>
+        <p:grpSpPr>
+          <a:xfrm>
+            <a:off x="8032881" y="8188136"/>
+            <a:ext cx="2861459" cy="908062"/>
+            <a:chOff x="2989943" y="595086"/>
+            <a:chExt cx="4579257" cy="1016000"/>
+          </a:xfrm>
+        </p:grpSpPr>
+        <p:sp>
+          <p:nvSpPr>
+            <p:cNvPr id="16" name="Rectangle 15">
+              <a:extLst>
+                <a:ext uri="{FF2B5EF4-FFF2-40B4-BE49-F238E27FC236}">
+                  <a16:creationId xmlns:a16="http://schemas.microsoft.com/office/drawing/2014/main" id="{F039646A-B1F4-4A5F-AF33-64CEC65353E0}"/>
+                </a:ext>
+              </a:extLst>
+            </p:cNvPr>
+            <p:cNvSpPr/>
+            <p:nvPr/>
+          </p:nvSpPr>
+          <p:spPr>
+            <a:xfrm>
+              <a:off x="2989943" y="595086"/>
+              <a:ext cx="4579257" cy="508000"/>
+            </a:xfrm>
+            <a:prstGeom prst="rect">
+              <a:avLst/>
+            </a:prstGeom>
+            <a:solidFill>
+              <a:srgbClr val="006C31"/>
+            </a:solidFill>
+            <a:ln>
+              <a:noFill/>
+            </a:ln>
+          </p:spPr>
+          <p:style>
+            <a:lnRef idx="2">
+              <a:schemeClr val="accent1">
+                <a:shade val="50000"/>
+              </a:schemeClr>
+            </a:lnRef>
+            <a:fillRef idx="1">
+              <a:schemeClr val="accent1"/>
+            </a:fillRef>
+            <a:effectRef idx="0">
+              <a:schemeClr val="accent1"/>
+            </a:effectRef>
+            <a:fontRef idx="minor">
+              <a:schemeClr val="lt1"/>
+            </a:fontRef>
+          </p:style>
+          <p:txBody>
+            <a:bodyPr rtlCol="0" anchor="ctr"/>
+            <a:lstStyle/>
+            <a:p>
+              <a:pPr algn="ctr"/>
+              <a:r>
+                <a:rPr lang="en-CA" b="1" dirty="0"/>
+                <a:t>P.M. and Cabinet</a:t>
+              </a:r>
+            </a:p>
+          </p:txBody>
+        </p:sp>
+        <p:sp>
+          <p:nvSpPr>
+            <p:cNvPr id="17" name="Rectangle 16">
+              <a:extLst>
+                <a:ext uri="{FF2B5EF4-FFF2-40B4-BE49-F238E27FC236}">
+                  <a16:creationId xmlns:a16="http://schemas.microsoft.com/office/drawing/2014/main" id="{6B547972-40A1-41BF-B0CE-1E3810353930}"/>
+                </a:ext>
+              </a:extLst>
+            </p:cNvPr>
+            <p:cNvSpPr/>
+            <p:nvPr/>
+          </p:nvSpPr>
+          <p:spPr>
+            <a:xfrm>
+              <a:off x="2989943" y="1103086"/>
+              <a:ext cx="4579257" cy="508000"/>
+            </a:xfrm>
+            <a:prstGeom prst="rect">
+              <a:avLst/>
+            </a:prstGeom>
+            <a:solidFill>
+              <a:srgbClr val="A7D971"/>
+            </a:solidFill>
+            <a:ln>
+              <a:noFill/>
+            </a:ln>
+          </p:spPr>
+          <p:style>
+            <a:lnRef idx="2">
+              <a:schemeClr val="accent1">
+                <a:shade val="50000"/>
+              </a:schemeClr>
+            </a:lnRef>
+            <a:fillRef idx="1">
+              <a:schemeClr val="accent1"/>
+            </a:fillRef>
+            <a:effectRef idx="0">
+              <a:schemeClr val="accent1"/>
+            </a:effectRef>
+            <a:fontRef idx="minor">
+              <a:schemeClr val="lt1"/>
+            </a:fontRef>
+          </p:style>
+          <p:txBody>
+            <a:bodyPr rtlCol="0" anchor="ctr"/>
+            <a:lstStyle/>
+            <a:p>
+              <a:pPr algn="ctr"/>
+              <a:r>
+                <a:rPr lang="en-CA" dirty="0"/>
+                <a:t>Implement laws</a:t>
+              </a:r>
+            </a:p>
+          </p:txBody>
+        </p:sp>
+      </p:grpSp>
+      <p:cxnSp>
+        <p:nvCxnSpPr>
+          <p:cNvPr id="19" name="Straight Connector 18">
+            <a:extLst>
+              <a:ext uri="{FF2B5EF4-FFF2-40B4-BE49-F238E27FC236}">
+                <a16:creationId xmlns:a16="http://schemas.microsoft.com/office/drawing/2014/main" id="{922636F7-1852-4688-BCCF-D6590A50557E}"/>
+              </a:ext>
+            </a:extLst>
+          </p:cNvPr>
+          <p:cNvCxnSpPr>
+            <a:cxnSpLocks/>
+            <a:endCxn id="40" idx="0"/>
+          </p:cNvCxnSpPr>
+          <p:nvPr/>
+        </p:nvCxnSpPr>
+        <p:spPr>
+          <a:xfrm>
+            <a:off x="6366182" y="5496154"/>
+            <a:ext cx="0" cy="675033"/>
+          </a:xfrm>
+          <a:prstGeom prst="line">
+            <a:avLst/>
+          </a:prstGeom>
+          <a:ln w="57150">
+            <a:solidFill>
+              <a:schemeClr val="tx1"/>
+            </a:solidFill>
+          </a:ln>
+        </p:spPr>
+        <p:style>
+          <a:lnRef idx="1">
+            <a:schemeClr val="accent1"/>
+          </a:lnRef>
+          <a:fillRef idx="0">
+            <a:schemeClr val="accent1"/>
+          </a:fillRef>
+          <a:effectRef idx="0">
+            <a:schemeClr val="accent1"/>
+          </a:effectRef>
+          <a:fontRef idx="minor">
+            <a:schemeClr val="tx1"/>
+          </a:fontRef>
+        </p:style>
+      </p:cxnSp>
+      <p:sp>
+        <p:nvSpPr>
+          <p:cNvPr id="36" name="Rectangle 35">
+            <a:extLst>
+              <a:ext uri="{FF2B5EF4-FFF2-40B4-BE49-F238E27FC236}">
+                <a16:creationId xmlns:a16="http://schemas.microsoft.com/office/drawing/2014/main" id="{4E306598-46E8-4EDE-B0E9-5B9DDA8CAEC4}"/>
+              </a:ext>
+            </a:extLst>
+          </p:cNvPr>
+          <p:cNvSpPr/>
+          <p:nvPr/>
+        </p:nvSpPr>
+        <p:spPr>
+          <a:xfrm>
+            <a:off x="1891006" y="9721022"/>
+            <a:ext cx="1779720" cy="454031"/>
+          </a:xfrm>
+          <a:prstGeom prst="rect">
+            <a:avLst/>
+          </a:prstGeom>
+          <a:solidFill>
+            <a:srgbClr val="006C31"/>
+          </a:solidFill>
+          <a:ln>
+            <a:noFill/>
+          </a:ln>
+        </p:spPr>
+        <p:style>
+          <a:lnRef idx="2">
+            <a:schemeClr val="accent1">
+              <a:shade val="50000"/>
+            </a:schemeClr>
+          </a:lnRef>
+          <a:fillRef idx="1">
+            <a:schemeClr val="accent1"/>
+          </a:fillRef>
+          <a:effectRef idx="0">
+            <a:schemeClr val="accent1"/>
+          </a:effectRef>
+          <a:fontRef idx="minor">
+            <a:schemeClr val="lt1"/>
+          </a:fontRef>
+        </p:style>
+        <p:txBody>
+          <a:bodyPr rtlCol="0" anchor="ctr"/>
+          <a:lstStyle/>
+          <a:p>
+            <a:pPr algn="ctr"/>
+            <a:r>
+              <a:rPr lang="en-CA" b="1" dirty="0"/>
+              <a:t>Electorate</a:t>
+            </a:r>
+          </a:p>
+        </p:txBody>
+      </p:sp>
+      <p:sp>
+        <p:nvSpPr>
+          <p:cNvPr id="44" name="Rectangle 43">
+            <a:extLst>
+              <a:ext uri="{FF2B5EF4-FFF2-40B4-BE49-F238E27FC236}">
+                <a16:creationId xmlns:a16="http://schemas.microsoft.com/office/drawing/2014/main" id="{268594F8-38A2-44E4-AEF3-D4C01A1426D0}"/>
+              </a:ext>
+            </a:extLst>
+          </p:cNvPr>
+          <p:cNvSpPr/>
+          <p:nvPr/>
+        </p:nvSpPr>
+        <p:spPr>
+          <a:xfrm rot="16200000">
+            <a:off x="595867" y="4794132"/>
+            <a:ext cx="1797379" cy="454031"/>
+          </a:xfrm>
+          <a:prstGeom prst="rect">
+            <a:avLst/>
+          </a:prstGeom>
+          <a:solidFill>
+            <a:srgbClr val="C00000"/>
+          </a:solidFill>
+          <a:ln>
+            <a:noFill/>
+          </a:ln>
+        </p:spPr>
+        <p:style>
+          <a:lnRef idx="2">
+            <a:schemeClr val="accent1">
+              <a:shade val="50000"/>
+            </a:schemeClr>
+          </a:lnRef>
+          <a:fillRef idx="1">
+            <a:schemeClr val="accent1"/>
+          </a:fillRef>
+          <a:effectRef idx="0">
+            <a:schemeClr val="accent1"/>
+          </a:effectRef>
+          <a:fontRef idx="minor">
+            <a:schemeClr val="lt1"/>
+          </a:fontRef>
+        </p:style>
+        <p:txBody>
+          <a:bodyPr rtlCol="0" anchor="ctr"/>
+          <a:lstStyle/>
+          <a:p>
+            <a:pPr algn="ctr"/>
+            <a:r>
+              <a:rPr lang="en-CA" b="1" dirty="0"/>
+              <a:t>United Kingdom</a:t>
+            </a:r>
+          </a:p>
+        </p:txBody>
+      </p:sp>
+      <p:grpSp>
+        <p:nvGrpSpPr>
+          <p:cNvPr id="56" name="Group 55">
+            <a:extLst>
+              <a:ext uri="{FF2B5EF4-FFF2-40B4-BE49-F238E27FC236}">
+                <a16:creationId xmlns:a16="http://schemas.microsoft.com/office/drawing/2014/main" id="{96D1396B-C417-4794-B357-A8B3D150432A}"/>
+              </a:ext>
+            </a:extLst>
+          </p:cNvPr>
+          <p:cNvGrpSpPr/>
+          <p:nvPr/>
+        </p:nvGrpSpPr>
+        <p:grpSpPr>
+          <a:xfrm>
+            <a:off x="1848818" y="4340629"/>
+            <a:ext cx="2920062" cy="1466573"/>
+            <a:chOff x="10079864" y="1601272"/>
+            <a:chExt cx="2774857" cy="1466573"/>
+          </a:xfrm>
+        </p:grpSpPr>
+        <p:sp>
+          <p:nvSpPr>
+            <p:cNvPr id="46" name="Rectangle 45">
+              <a:extLst>
+                <a:ext uri="{FF2B5EF4-FFF2-40B4-BE49-F238E27FC236}">
+                  <a16:creationId xmlns:a16="http://schemas.microsoft.com/office/drawing/2014/main" id="{5A27A990-2DC9-4CB4-B758-12E07519A1E8}"/>
+                </a:ext>
+              </a:extLst>
+            </p:cNvPr>
+            <p:cNvSpPr/>
+            <p:nvPr/>
+          </p:nvSpPr>
+          <p:spPr>
+            <a:xfrm>
+              <a:off x="10079864" y="2060138"/>
+              <a:ext cx="2688827" cy="962104"/>
+            </a:xfrm>
+            <a:prstGeom prst="rect">
+              <a:avLst/>
+            </a:prstGeom>
+            <a:solidFill>
+              <a:srgbClr val="FFFF9F"/>
+            </a:solidFill>
+            <a:ln>
+              <a:noFill/>
+            </a:ln>
+          </p:spPr>
+          <p:style>
+            <a:lnRef idx="2">
+              <a:schemeClr val="accent1">
+                <a:shade val="50000"/>
+              </a:schemeClr>
+            </a:lnRef>
+            <a:fillRef idx="1">
+              <a:schemeClr val="accent1"/>
+            </a:fillRef>
+            <a:effectRef idx="0">
+              <a:schemeClr val="accent1"/>
+            </a:effectRef>
+            <a:fontRef idx="minor">
+              <a:schemeClr val="lt1"/>
+            </a:fontRef>
+          </p:style>
+          <p:txBody>
+            <a:bodyPr rtlCol="0" anchor="ctr"/>
+            <a:lstStyle/>
+            <a:p>
+              <a:pPr algn="ctr"/>
+              <a:endParaRPr lang="en-CA" dirty="0"/>
+            </a:p>
+          </p:txBody>
+        </p:sp>
+        <p:sp>
+          <p:nvSpPr>
+            <p:cNvPr id="48" name="Rectangle 47">
+              <a:extLst>
+                <a:ext uri="{FF2B5EF4-FFF2-40B4-BE49-F238E27FC236}">
+                  <a16:creationId xmlns:a16="http://schemas.microsoft.com/office/drawing/2014/main" id="{92B65F83-D68F-408C-A861-3A50648BECE4}"/>
+                </a:ext>
+              </a:extLst>
+            </p:cNvPr>
+            <p:cNvSpPr/>
+            <p:nvPr/>
+          </p:nvSpPr>
+          <p:spPr>
+            <a:xfrm>
+              <a:off x="10079865" y="1601272"/>
+              <a:ext cx="2688826" cy="458865"/>
+            </a:xfrm>
+            <a:prstGeom prst="rect">
+              <a:avLst/>
+            </a:prstGeom>
+            <a:solidFill>
+              <a:srgbClr val="FFFF00"/>
+            </a:solidFill>
+            <a:ln>
+              <a:noFill/>
+            </a:ln>
+          </p:spPr>
+          <p:style>
+            <a:lnRef idx="2">
+              <a:schemeClr val="accent1">
+                <a:shade val="50000"/>
+              </a:schemeClr>
+            </a:lnRef>
+            <a:fillRef idx="1">
+              <a:schemeClr val="accent1"/>
+            </a:fillRef>
+            <a:effectRef idx="0">
+              <a:schemeClr val="accent1"/>
+            </a:effectRef>
+            <a:fontRef idx="minor">
+              <a:schemeClr val="lt1"/>
+            </a:fontRef>
+          </p:style>
+          <p:txBody>
+            <a:bodyPr rtlCol="0" anchor="ctr"/>
+            <a:lstStyle/>
+            <a:p>
+              <a:pPr algn="ctr"/>
+              <a:r>
+                <a:rPr lang="en-CA" b="1" dirty="0">
+                  <a:solidFill>
+                    <a:schemeClr val="tx1"/>
+                  </a:solidFill>
+                </a:rPr>
+                <a:t>Legend</a:t>
+              </a:r>
+            </a:p>
+          </p:txBody>
+        </p:sp>
+        <p:cxnSp>
+          <p:nvCxnSpPr>
+            <p:cNvPr id="50" name="Straight Connector 49">
+              <a:extLst>
+                <a:ext uri="{FF2B5EF4-FFF2-40B4-BE49-F238E27FC236}">
+                  <a16:creationId xmlns:a16="http://schemas.microsoft.com/office/drawing/2014/main" id="{E72E17E0-894A-4233-81F8-FD8C8043D0B7}"/>
+                </a:ext>
+              </a:extLst>
+            </p:cNvPr>
+            <p:cNvCxnSpPr>
+              <a:cxnSpLocks/>
+            </p:cNvCxnSpPr>
+            <p:nvPr/>
+          </p:nvCxnSpPr>
+          <p:spPr>
+            <a:xfrm>
+              <a:off x="10247290" y="2283327"/>
+              <a:ext cx="412124" cy="0"/>
+            </a:xfrm>
+            <a:prstGeom prst="line">
+              <a:avLst/>
+            </a:prstGeom>
+            <a:ln w="57150">
+              <a:solidFill>
+                <a:schemeClr val="tx1"/>
+              </a:solidFill>
+            </a:ln>
+          </p:spPr>
+          <p:style>
+            <a:lnRef idx="1">
+              <a:schemeClr val="accent1"/>
+            </a:lnRef>
+            <a:fillRef idx="0">
+              <a:schemeClr val="accent1"/>
+            </a:fillRef>
+            <a:effectRef idx="0">
+              <a:schemeClr val="accent1"/>
+            </a:effectRef>
+            <a:fontRef idx="minor">
+              <a:schemeClr val="tx1"/>
+            </a:fontRef>
+          </p:style>
+        </p:cxnSp>
+        <p:sp>
+          <p:nvSpPr>
+            <p:cNvPr id="53" name="TextBox 52">
+              <a:extLst>
+                <a:ext uri="{FF2B5EF4-FFF2-40B4-BE49-F238E27FC236}">
+                  <a16:creationId xmlns:a16="http://schemas.microsoft.com/office/drawing/2014/main" id="{26A7566D-AD88-4E03-AB16-FFAE0F1D0608}"/>
+                </a:ext>
+              </a:extLst>
+            </p:cNvPr>
+            <p:cNvSpPr txBox="1"/>
+            <p:nvPr/>
+          </p:nvSpPr>
+          <p:spPr>
+            <a:xfrm>
+              <a:off x="10710929" y="2098661"/>
+              <a:ext cx="2143792" cy="369332"/>
+            </a:xfrm>
+            <a:prstGeom prst="rect">
+              <a:avLst/>
+            </a:prstGeom>
+            <a:noFill/>
+          </p:spPr>
+          <p:txBody>
+            <a:bodyPr wrap="none" rtlCol="0">
+              <a:spAutoFit/>
+            </a:bodyPr>
+            <a:lstStyle/>
+            <a:p>
+              <a:r>
+                <a:rPr lang="en-CA" dirty="0"/>
+                <a:t>Relation of Authority</a:t>
+              </a:r>
+            </a:p>
+          </p:txBody>
+        </p:sp>
+        <p:cxnSp>
+          <p:nvCxnSpPr>
+            <p:cNvPr id="54" name="Straight Connector 53">
+              <a:extLst>
+                <a:ext uri="{FF2B5EF4-FFF2-40B4-BE49-F238E27FC236}">
+                  <a16:creationId xmlns:a16="http://schemas.microsoft.com/office/drawing/2014/main" id="{1E2F261A-68E0-4E61-BA3D-52D13DF54BE7}"/>
+                </a:ext>
+              </a:extLst>
+            </p:cNvPr>
+            <p:cNvCxnSpPr>
+              <a:cxnSpLocks/>
+            </p:cNvCxnSpPr>
+            <p:nvPr/>
+          </p:nvCxnSpPr>
+          <p:spPr>
+            <a:xfrm>
+              <a:off x="10247290" y="2741474"/>
+              <a:ext cx="412124" cy="0"/>
+            </a:xfrm>
+            <a:prstGeom prst="line">
+              <a:avLst/>
+            </a:prstGeom>
+            <a:ln w="57150">
+              <a:solidFill>
+                <a:schemeClr val="bg2">
+                  <a:lumMod val="90000"/>
+                </a:schemeClr>
+              </a:solidFill>
+            </a:ln>
+          </p:spPr>
+          <p:style>
+            <a:lnRef idx="1">
+              <a:schemeClr val="accent1"/>
+            </a:lnRef>
+            <a:fillRef idx="0">
+              <a:schemeClr val="accent1"/>
+            </a:fillRef>
+            <a:effectRef idx="0">
+              <a:schemeClr val="accent1"/>
+            </a:effectRef>
+            <a:fontRef idx="minor">
+              <a:schemeClr val="tx1"/>
+            </a:fontRef>
+          </p:style>
+        </p:cxnSp>
+        <p:sp>
+          <p:nvSpPr>
+            <p:cNvPr id="55" name="TextBox 54">
+              <a:extLst>
+                <a:ext uri="{FF2B5EF4-FFF2-40B4-BE49-F238E27FC236}">
+                  <a16:creationId xmlns:a16="http://schemas.microsoft.com/office/drawing/2014/main" id="{F2F607E6-8505-48C2-93EC-50BDB14C14F6}"/>
+                </a:ext>
+              </a:extLst>
+            </p:cNvPr>
+            <p:cNvSpPr txBox="1"/>
+            <p:nvPr/>
+          </p:nvSpPr>
+          <p:spPr>
+            <a:xfrm>
+              <a:off x="10710929" y="2556808"/>
+              <a:ext cx="1008609" cy="511037"/>
+            </a:xfrm>
+            <a:prstGeom prst="rect">
+              <a:avLst/>
+            </a:prstGeom>
+            <a:noFill/>
+          </p:spPr>
+          <p:txBody>
+            <a:bodyPr wrap="none" rtlCol="0">
+              <a:spAutoFit/>
+            </a:bodyPr>
+            <a:lstStyle/>
+            <a:p>
+              <a:r>
+                <a:rPr lang="en-CA" dirty="0"/>
+                <a:t>Elects</a:t>
+              </a:r>
+            </a:p>
+          </p:txBody>
+        </p:sp>
+      </p:grpSp>
+      <p:grpSp>
+        <p:nvGrpSpPr>
+          <p:cNvPr id="39" name="Group 38">
+            <a:extLst>
+              <a:ext uri="{FF2B5EF4-FFF2-40B4-BE49-F238E27FC236}">
+                <a16:creationId xmlns:a16="http://schemas.microsoft.com/office/drawing/2014/main" id="{64689597-8E9C-4A79-A99D-17E75DFD7615}"/>
+              </a:ext>
+            </a:extLst>
+          </p:cNvPr>
+          <p:cNvGrpSpPr/>
+          <p:nvPr/>
+        </p:nvGrpSpPr>
+        <p:grpSpPr>
+          <a:xfrm>
+            <a:off x="4935452" y="6171187"/>
+            <a:ext cx="2861459" cy="908062"/>
+            <a:chOff x="2989943" y="595086"/>
+            <a:chExt cx="4579257" cy="1016000"/>
+          </a:xfrm>
+        </p:grpSpPr>
+        <p:sp>
+          <p:nvSpPr>
+            <p:cNvPr id="40" name="Rectangle 39">
+              <a:extLst>
+                <a:ext uri="{FF2B5EF4-FFF2-40B4-BE49-F238E27FC236}">
+                  <a16:creationId xmlns:a16="http://schemas.microsoft.com/office/drawing/2014/main" id="{35058813-3B71-4296-A390-F1200CDED92D}"/>
+                </a:ext>
+              </a:extLst>
+            </p:cNvPr>
+            <p:cNvSpPr/>
+            <p:nvPr/>
+          </p:nvSpPr>
+          <p:spPr>
+            <a:xfrm>
+              <a:off x="2989943" y="595086"/>
+              <a:ext cx="4579257" cy="508000"/>
+            </a:xfrm>
+            <a:prstGeom prst="rect">
+              <a:avLst/>
+            </a:prstGeom>
+            <a:solidFill>
+              <a:srgbClr val="C00000"/>
+            </a:solidFill>
+            <a:ln>
+              <a:noFill/>
+            </a:ln>
+          </p:spPr>
+          <p:style>
+            <a:lnRef idx="2">
+              <a:schemeClr val="accent1">
+                <a:shade val="50000"/>
+              </a:schemeClr>
+            </a:lnRef>
+            <a:fillRef idx="1">
+              <a:schemeClr val="accent1"/>
+            </a:fillRef>
+            <a:effectRef idx="0">
+              <a:schemeClr val="accent1"/>
+            </a:effectRef>
+            <a:fontRef idx="minor">
+              <a:schemeClr val="lt1"/>
+            </a:fontRef>
+          </p:style>
+          <p:txBody>
+            <a:bodyPr rtlCol="0" anchor="ctr"/>
+            <a:lstStyle/>
+            <a:p>
+              <a:pPr algn="ctr"/>
+              <a:r>
+                <a:rPr lang="en-CA" b="1" dirty="0"/>
+                <a:t>Governor General</a:t>
+              </a:r>
+            </a:p>
+          </p:txBody>
+        </p:sp>
+        <p:sp>
+          <p:nvSpPr>
+            <p:cNvPr id="45" name="Rectangle 44">
+              <a:extLst>
+                <a:ext uri="{FF2B5EF4-FFF2-40B4-BE49-F238E27FC236}">
+                  <a16:creationId xmlns:a16="http://schemas.microsoft.com/office/drawing/2014/main" id="{F90E75A6-F4CE-4F71-A6F4-4CB9D026E90F}"/>
+                </a:ext>
+              </a:extLst>
+            </p:cNvPr>
+            <p:cNvSpPr/>
+            <p:nvPr/>
+          </p:nvSpPr>
+          <p:spPr>
+            <a:xfrm>
+              <a:off x="2989943" y="1103086"/>
+              <a:ext cx="4579257" cy="508000"/>
+            </a:xfrm>
+            <a:prstGeom prst="rect">
+              <a:avLst/>
+            </a:prstGeom>
+            <a:solidFill>
+              <a:srgbClr val="FF8585"/>
+            </a:solidFill>
+            <a:ln>
+              <a:noFill/>
+            </a:ln>
+          </p:spPr>
+          <p:style>
+            <a:lnRef idx="2">
+              <a:schemeClr val="accent1">
+                <a:shade val="50000"/>
+              </a:schemeClr>
+            </a:lnRef>
+            <a:fillRef idx="1">
+              <a:schemeClr val="accent1"/>
+            </a:fillRef>
+            <a:effectRef idx="0">
+              <a:schemeClr val="accent1"/>
+            </a:effectRef>
+            <a:fontRef idx="minor">
+              <a:schemeClr val="lt1"/>
+            </a:fontRef>
+          </p:style>
+          <p:txBody>
+            <a:bodyPr rtlCol="0" anchor="ctr"/>
+            <a:lstStyle/>
+            <a:p>
+              <a:pPr algn="ctr"/>
+              <a:r>
+                <a:rPr lang="en-CA" dirty="0"/>
+                <a:t>Approves laws</a:t>
+              </a:r>
+            </a:p>
+          </p:txBody>
+        </p:sp>
+      </p:grpSp>
+      <p:grpSp>
+        <p:nvGrpSpPr>
+          <p:cNvPr id="47" name="Group 46">
+            <a:extLst>
+              <a:ext uri="{FF2B5EF4-FFF2-40B4-BE49-F238E27FC236}">
+                <a16:creationId xmlns:a16="http://schemas.microsoft.com/office/drawing/2014/main" id="{E1E23967-FBC4-4758-8510-7B8A82D0758D}"/>
+              </a:ext>
+            </a:extLst>
+          </p:cNvPr>
+          <p:cNvGrpSpPr/>
+          <p:nvPr/>
+        </p:nvGrpSpPr>
+        <p:grpSpPr>
+          <a:xfrm>
+            <a:off x="4935452" y="8188136"/>
+            <a:ext cx="2659224" cy="1135479"/>
+            <a:chOff x="2989943" y="595086"/>
+            <a:chExt cx="4579257" cy="1270449"/>
+          </a:xfrm>
+        </p:grpSpPr>
+        <p:sp>
+          <p:nvSpPr>
+            <p:cNvPr id="49" name="Rectangle 48">
+              <a:extLst>
+                <a:ext uri="{FF2B5EF4-FFF2-40B4-BE49-F238E27FC236}">
+                  <a16:creationId xmlns:a16="http://schemas.microsoft.com/office/drawing/2014/main" id="{840DE9CA-A689-47E4-A761-C4F136F18B90}"/>
+                </a:ext>
+              </a:extLst>
+            </p:cNvPr>
+            <p:cNvSpPr/>
+            <p:nvPr/>
+          </p:nvSpPr>
+          <p:spPr>
+            <a:xfrm>
+              <a:off x="2989943" y="595086"/>
+              <a:ext cx="4579257" cy="508000"/>
+            </a:xfrm>
+            <a:prstGeom prst="rect">
+              <a:avLst/>
+            </a:prstGeom>
+            <a:solidFill>
+              <a:srgbClr val="006C31"/>
+            </a:solidFill>
+            <a:ln>
+              <a:noFill/>
+            </a:ln>
+          </p:spPr>
+          <p:style>
+            <a:lnRef idx="2">
+              <a:schemeClr val="accent1">
+                <a:shade val="50000"/>
+              </a:schemeClr>
+            </a:lnRef>
+            <a:fillRef idx="1">
+              <a:schemeClr val="accent1"/>
+            </a:fillRef>
+            <a:effectRef idx="0">
+              <a:schemeClr val="accent1"/>
+            </a:effectRef>
+            <a:fontRef idx="minor">
+              <a:schemeClr val="lt1"/>
+            </a:fontRef>
+          </p:style>
+          <p:txBody>
+            <a:bodyPr rtlCol="0" anchor="ctr"/>
+            <a:lstStyle/>
+            <a:p>
+              <a:pPr algn="ctr"/>
+              <a:r>
+                <a:rPr lang="en-CA" b="1" dirty="0"/>
+                <a:t>Senate (L.C.)</a:t>
+              </a:r>
+            </a:p>
+          </p:txBody>
+        </p:sp>
+        <p:sp>
+          <p:nvSpPr>
+            <p:cNvPr id="51" name="Rectangle 50">
+              <a:extLst>
+                <a:ext uri="{FF2B5EF4-FFF2-40B4-BE49-F238E27FC236}">
+                  <a16:creationId xmlns:a16="http://schemas.microsoft.com/office/drawing/2014/main" id="{29A9292C-33F0-48F7-8364-0F7E82EBA7A2}"/>
+                </a:ext>
+              </a:extLst>
+            </p:cNvPr>
+            <p:cNvSpPr/>
+            <p:nvPr/>
+          </p:nvSpPr>
+          <p:spPr>
+            <a:xfrm>
+              <a:off x="2989943" y="1103086"/>
+              <a:ext cx="4579257" cy="762449"/>
+            </a:xfrm>
+            <a:prstGeom prst="rect">
+              <a:avLst/>
+            </a:prstGeom>
+            <a:solidFill>
+              <a:srgbClr val="A7D971"/>
+            </a:solidFill>
+            <a:ln>
+              <a:noFill/>
+            </a:ln>
+          </p:spPr>
+          <p:style>
+            <a:lnRef idx="2">
+              <a:schemeClr val="accent1">
+                <a:shade val="50000"/>
+              </a:schemeClr>
+            </a:lnRef>
+            <a:fillRef idx="1">
+              <a:schemeClr val="accent1"/>
+            </a:fillRef>
+            <a:effectRef idx="0">
+              <a:schemeClr val="accent1"/>
+            </a:effectRef>
+            <a:fontRef idx="minor">
+              <a:schemeClr val="lt1"/>
+            </a:fontRef>
+          </p:style>
+          <p:txBody>
+            <a:bodyPr rtlCol="0" anchor="ctr"/>
+            <a:lstStyle/>
+            <a:p>
+              <a:pPr algn="ctr"/>
+              <a:r>
+                <a:rPr lang="en-CA" dirty="0"/>
+                <a:t>Propose, study and vote on bills</a:t>
+              </a:r>
+            </a:p>
+          </p:txBody>
+        </p:sp>
+      </p:grpSp>
+      <p:sp>
+        <p:nvSpPr>
+          <p:cNvPr id="67" name="Rectangle 66">
+            <a:extLst>
+              <a:ext uri="{FF2B5EF4-FFF2-40B4-BE49-F238E27FC236}">
+                <a16:creationId xmlns:a16="http://schemas.microsoft.com/office/drawing/2014/main" id="{85986811-87AB-4EE8-9110-C6974C4F3264}"/>
+              </a:ext>
+            </a:extLst>
+          </p:cNvPr>
+          <p:cNvSpPr/>
+          <p:nvPr/>
+        </p:nvSpPr>
+        <p:spPr>
+          <a:xfrm>
+            <a:off x="8351376" y="7660075"/>
+            <a:ext cx="1999427" cy="301046"/>
+          </a:xfrm>
+          <a:prstGeom prst="rect">
+            <a:avLst/>
+          </a:prstGeom>
+          <a:solidFill>
+            <a:srgbClr val="DAEFC3"/>
+          </a:solidFill>
+          <a:ln>
+            <a:noFill/>
+          </a:ln>
+        </p:spPr>
+        <p:style>
+          <a:lnRef idx="2">
+            <a:schemeClr val="accent1">
+              <a:shade val="50000"/>
+            </a:schemeClr>
+          </a:lnRef>
+          <a:fillRef idx="1">
+            <a:schemeClr val="accent1"/>
+          </a:fillRef>
+          <a:effectRef idx="0">
+            <a:schemeClr val="accent1"/>
+          </a:effectRef>
+          <a:fontRef idx="minor">
+            <a:schemeClr val="lt1"/>
+          </a:fontRef>
+        </p:style>
+        <p:txBody>
+          <a:bodyPr rtlCol="0" anchor="ctr"/>
+          <a:lstStyle/>
+          <a:p>
+            <a:pPr algn="ctr"/>
+            <a:r>
+              <a:rPr lang="en-CA" dirty="0">
+                <a:solidFill>
+                  <a:schemeClr val="tx1"/>
+                </a:solidFill>
+              </a:rPr>
+              <a:t>Executive Branch</a:t>
+            </a:r>
+          </a:p>
+        </p:txBody>
+      </p:sp>
+      <p:grpSp>
+        <p:nvGrpSpPr>
+          <p:cNvPr id="8" name="Group 7">
+            <a:extLst>
+              <a:ext uri="{FF2B5EF4-FFF2-40B4-BE49-F238E27FC236}">
+                <a16:creationId xmlns:a16="http://schemas.microsoft.com/office/drawing/2014/main" id="{959F7CD9-D2F7-41C1-B827-4EE8164D2BC3}"/>
+              </a:ext>
+            </a:extLst>
+          </p:cNvPr>
+          <p:cNvGrpSpPr/>
+          <p:nvPr/>
+        </p:nvGrpSpPr>
+        <p:grpSpPr>
+          <a:xfrm>
+            <a:off x="4935452" y="4612783"/>
+            <a:ext cx="4092765" cy="908062"/>
+            <a:chOff x="2989943" y="595086"/>
+            <a:chExt cx="4579257" cy="1016000"/>
+          </a:xfrm>
+        </p:grpSpPr>
+        <p:sp>
+          <p:nvSpPr>
+            <p:cNvPr id="4" name="Rectangle 3">
+              <a:extLst>
+                <a:ext uri="{FF2B5EF4-FFF2-40B4-BE49-F238E27FC236}">
+                  <a16:creationId xmlns:a16="http://schemas.microsoft.com/office/drawing/2014/main" id="{7547F1CB-8A8C-4ACA-84FC-DC629B1107EF}"/>
+                </a:ext>
+              </a:extLst>
+            </p:cNvPr>
+            <p:cNvSpPr/>
+            <p:nvPr/>
+          </p:nvSpPr>
+          <p:spPr>
+            <a:xfrm>
+              <a:off x="2989943" y="595086"/>
+              <a:ext cx="4579257" cy="508000"/>
+            </a:xfrm>
+            <a:prstGeom prst="rect">
+              <a:avLst/>
+            </a:prstGeom>
+            <a:solidFill>
+              <a:srgbClr val="C00000"/>
+            </a:solidFill>
+            <a:ln>
+              <a:noFill/>
+            </a:ln>
+          </p:spPr>
+          <p:style>
+            <a:lnRef idx="2">
+              <a:schemeClr val="accent1">
+                <a:shade val="50000"/>
+              </a:schemeClr>
+            </a:lnRef>
+            <a:fillRef idx="1">
+              <a:schemeClr val="accent1"/>
+            </a:fillRef>
+            <a:effectRef idx="0">
+              <a:schemeClr val="accent1"/>
+            </a:effectRef>
+            <a:fontRef idx="minor">
+              <a:schemeClr val="lt1"/>
+            </a:fontRef>
+          </p:style>
+          <p:txBody>
+            <a:bodyPr rtlCol="0" anchor="ctr"/>
+            <a:lstStyle/>
+            <a:p>
+              <a:pPr algn="ctr"/>
+              <a:r>
+                <a:rPr lang="en-CA" b="1" dirty="0"/>
+                <a:t>British Government</a:t>
+              </a:r>
+            </a:p>
+          </p:txBody>
+        </p:sp>
+        <p:sp>
+          <p:nvSpPr>
+            <p:cNvPr id="5" name="Rectangle 4">
+              <a:extLst>
+                <a:ext uri="{FF2B5EF4-FFF2-40B4-BE49-F238E27FC236}">
+                  <a16:creationId xmlns:a16="http://schemas.microsoft.com/office/drawing/2014/main" id="{06530BD1-FD3F-4E6E-A7D9-B4B35A96BC54}"/>
+                </a:ext>
+              </a:extLst>
+            </p:cNvPr>
+            <p:cNvSpPr/>
+            <p:nvPr/>
+          </p:nvSpPr>
+          <p:spPr>
+            <a:xfrm>
+              <a:off x="2989943" y="1103086"/>
+              <a:ext cx="4579257" cy="508000"/>
+            </a:xfrm>
+            <a:prstGeom prst="rect">
+              <a:avLst/>
+            </a:prstGeom>
+            <a:solidFill>
+              <a:srgbClr val="FF8585"/>
+            </a:solidFill>
+            <a:ln>
+              <a:noFill/>
+            </a:ln>
+          </p:spPr>
+          <p:style>
+            <a:lnRef idx="2">
+              <a:schemeClr val="accent1">
+                <a:shade val="50000"/>
+              </a:schemeClr>
+            </a:lnRef>
+            <a:fillRef idx="1">
+              <a:schemeClr val="accent1"/>
+            </a:fillRef>
+            <a:effectRef idx="0">
+              <a:schemeClr val="accent1"/>
+            </a:effectRef>
+            <a:fontRef idx="minor">
+              <a:schemeClr val="lt1"/>
+            </a:fontRef>
+          </p:style>
+          <p:txBody>
+            <a:bodyPr rtlCol="0" anchor="ctr"/>
+            <a:lstStyle/>
+            <a:p>
+              <a:pPr algn="ctr"/>
+              <a:r>
+                <a:rPr lang="en-CA" dirty="0"/>
+                <a:t>Sovereign and the Cabinet Ministers</a:t>
+              </a:r>
+            </a:p>
+          </p:txBody>
+        </p:sp>
+      </p:grpSp>
+      <p:cxnSp>
+        <p:nvCxnSpPr>
+          <p:cNvPr id="71" name="Straight Connector 70">
+            <a:extLst>
+              <a:ext uri="{FF2B5EF4-FFF2-40B4-BE49-F238E27FC236}">
+                <a16:creationId xmlns:a16="http://schemas.microsoft.com/office/drawing/2014/main" id="{63D1D15F-3EB0-44A1-A476-C2D1375D267F}"/>
+              </a:ext>
+            </a:extLst>
+          </p:cNvPr>
+          <p:cNvCxnSpPr>
+            <a:cxnSpLocks/>
+          </p:cNvCxnSpPr>
+          <p:nvPr/>
+        </p:nvCxnSpPr>
+        <p:spPr>
+          <a:xfrm>
+            <a:off x="4187030" y="9096196"/>
+            <a:ext cx="0" cy="432815"/>
+          </a:xfrm>
+          <a:prstGeom prst="line">
+            <a:avLst/>
+          </a:prstGeom>
+          <a:ln w="57150">
+            <a:solidFill>
+              <a:schemeClr val="tx1"/>
+            </a:solidFill>
+          </a:ln>
+        </p:spPr>
+        <p:style>
+          <a:lnRef idx="1">
+            <a:schemeClr val="accent1"/>
+          </a:lnRef>
+          <a:fillRef idx="0">
+            <a:schemeClr val="accent1"/>
+          </a:fillRef>
+          <a:effectRef idx="0">
+            <a:schemeClr val="accent1"/>
+          </a:effectRef>
+          <a:fontRef idx="minor">
+            <a:schemeClr val="tx1"/>
+          </a:fontRef>
+        </p:style>
+      </p:cxnSp>
+      <p:cxnSp>
+        <p:nvCxnSpPr>
+          <p:cNvPr id="73" name="Straight Connector 72">
+            <a:extLst>
+              <a:ext uri="{FF2B5EF4-FFF2-40B4-BE49-F238E27FC236}">
+                <a16:creationId xmlns:a16="http://schemas.microsoft.com/office/drawing/2014/main" id="{C6D9DB86-181F-4FFD-BACD-D3A3A763CEFC}"/>
+              </a:ext>
+            </a:extLst>
+          </p:cNvPr>
+          <p:cNvCxnSpPr>
+            <a:cxnSpLocks/>
+          </p:cNvCxnSpPr>
+          <p:nvPr/>
+        </p:nvCxnSpPr>
+        <p:spPr>
+          <a:xfrm>
+            <a:off x="4182634" y="9504943"/>
+            <a:ext cx="5275890" cy="0"/>
+          </a:xfrm>
+          <a:prstGeom prst="line">
+            <a:avLst/>
+          </a:prstGeom>
+          <a:ln w="57150">
+            <a:solidFill>
+              <a:schemeClr val="tx1"/>
+            </a:solidFill>
+          </a:ln>
+        </p:spPr>
+        <p:style>
+          <a:lnRef idx="1">
+            <a:schemeClr val="accent1"/>
+          </a:lnRef>
+          <a:fillRef idx="0">
+            <a:schemeClr val="accent1"/>
+          </a:fillRef>
+          <a:effectRef idx="0">
+            <a:schemeClr val="accent1"/>
+          </a:effectRef>
+          <a:fontRef idx="minor">
+            <a:schemeClr val="tx1"/>
+          </a:fontRef>
+        </p:style>
+      </p:cxnSp>
+      <p:cxnSp>
+        <p:nvCxnSpPr>
+          <p:cNvPr id="76" name="Straight Connector 75">
+            <a:extLst>
+              <a:ext uri="{FF2B5EF4-FFF2-40B4-BE49-F238E27FC236}">
+                <a16:creationId xmlns:a16="http://schemas.microsoft.com/office/drawing/2014/main" id="{FD78F515-3ECA-46FA-B71A-EE9FB259DE17}"/>
+              </a:ext>
+            </a:extLst>
+          </p:cNvPr>
+          <p:cNvCxnSpPr>
+            <a:cxnSpLocks/>
+            <a:stCxn id="17" idx="2"/>
+          </p:cNvCxnSpPr>
+          <p:nvPr/>
+        </p:nvCxnSpPr>
+        <p:spPr>
+          <a:xfrm>
+            <a:off x="9463611" y="9096198"/>
+            <a:ext cx="0" cy="432813"/>
+          </a:xfrm>
+          <a:prstGeom prst="line">
+            <a:avLst/>
+          </a:prstGeom>
+          <a:ln w="57150">
+            <a:solidFill>
+              <a:schemeClr val="tx1"/>
+            </a:solidFill>
+          </a:ln>
+        </p:spPr>
+        <p:style>
+          <a:lnRef idx="1">
+            <a:schemeClr val="accent1"/>
+          </a:lnRef>
+          <a:fillRef idx="0">
+            <a:schemeClr val="accent1"/>
+          </a:fillRef>
+          <a:effectRef idx="0">
+            <a:schemeClr val="accent1"/>
+          </a:effectRef>
+          <a:fontRef idx="minor">
+            <a:schemeClr val="tx1"/>
+          </a:fontRef>
+        </p:style>
+      </p:cxnSp>
+    </p:spTree>
+    <p:extLst>
+      <p:ext uri="{BB962C8B-B14F-4D97-AF65-F5344CB8AC3E}">
+        <p14:creationId xmlns:p14="http://schemas.microsoft.com/office/powerpoint/2010/main" val="3406890731"/>
+      </p:ext>
+    </p:extLst>
+  </p:cSld>
+  <p:clrMapOvr>
+    <a:masterClrMapping/>
+  </p:clrMapOvr>
+</p:sld>
+</file>
+
+<file path=ppt/slides/slide4.xml><?xml version="1.0" encoding="utf-8"?>
+<p:sld xmlns:a="http://schemas.openxmlformats.org/drawingml/2006/main" xmlns:r="http://schemas.openxmlformats.org/officeDocument/2006/relationships" xmlns:p="http://schemas.openxmlformats.org/presentationml/2006/main">
+  <p:cSld>
+    <p:spTree>
+      <p:nvGrpSpPr>
+        <p:cNvPr id="1" name=""/>
+        <p:cNvGrpSpPr/>
+        <p:nvPr/>
+      </p:nvGrpSpPr>
+      <p:grpSpPr>
+        <a:xfrm>
+          <a:off x="0" y="0"/>
+          <a:ext cx="0" cy="0"/>
+          <a:chOff x="0" y="0"/>
+          <a:chExt cx="0" cy="0"/>
+        </a:xfrm>
+      </p:grpSpPr>
+      <p:cxnSp>
+        <p:nvCxnSpPr>
+          <p:cNvPr id="12" name="Straight Connector 11">
+            <a:extLst>
+              <a:ext uri="{FF2B5EF4-FFF2-40B4-BE49-F238E27FC236}">
+                <a16:creationId xmlns:a16="http://schemas.microsoft.com/office/drawing/2014/main" id="{85981B6A-BA53-4D90-8045-7D2E7E6F7E21}"/>
+              </a:ext>
+            </a:extLst>
+          </p:cNvPr>
+          <p:cNvCxnSpPr>
+            <a:cxnSpLocks/>
+            <a:stCxn id="5" idx="2"/>
+            <a:endCxn id="6" idx="0"/>
+          </p:cNvCxnSpPr>
+          <p:nvPr/>
+        </p:nvCxnSpPr>
+        <p:spPr>
+          <a:xfrm flipH="1">
+            <a:off x="1786221" y="3512392"/>
+            <a:ext cx="5413885" cy="635763"/>
+          </a:xfrm>
+          <a:prstGeom prst="line">
+            <a:avLst/>
+          </a:prstGeom>
+          <a:ln w="19050">
+            <a:solidFill>
+              <a:schemeClr val="tx1"/>
+            </a:solidFill>
+          </a:ln>
+        </p:spPr>
+        <p:style>
+          <a:lnRef idx="1">
+            <a:schemeClr val="accent1"/>
+          </a:lnRef>
+          <a:fillRef idx="0">
+            <a:schemeClr val="accent1"/>
+          </a:fillRef>
+          <a:effectRef idx="0">
+            <a:schemeClr val="accent1"/>
+          </a:effectRef>
+          <a:fontRef idx="minor">
+            <a:schemeClr val="tx1"/>
+          </a:fontRef>
+        </p:style>
+      </p:cxnSp>
+      <p:sp>
+        <p:nvSpPr>
+          <p:cNvPr id="5" name="Rectangle 4">
+            <a:extLst>
+              <a:ext uri="{FF2B5EF4-FFF2-40B4-BE49-F238E27FC236}">
+                <a16:creationId xmlns:a16="http://schemas.microsoft.com/office/drawing/2014/main" id="{569F0725-376F-4246-A100-0DCDA8A8390B}"/>
+              </a:ext>
+            </a:extLst>
+          </p:cNvPr>
+          <p:cNvSpPr/>
+          <p:nvPr/>
+        </p:nvSpPr>
+        <p:spPr>
+          <a:xfrm>
+            <a:off x="5475609" y="3125638"/>
+            <a:ext cx="3448993" cy="386754"/>
+          </a:xfrm>
+          <a:prstGeom prst="rect">
+            <a:avLst/>
+          </a:prstGeom>
+          <a:solidFill>
+            <a:schemeClr val="accent2"/>
+          </a:solidFill>
+          <a:ln>
+            <a:noFill/>
+          </a:ln>
+        </p:spPr>
+        <p:style>
+          <a:lnRef idx="2">
+            <a:schemeClr val="accent1">
+              <a:shade val="50000"/>
+            </a:schemeClr>
+          </a:lnRef>
+          <a:fillRef idx="1">
+            <a:schemeClr val="accent1"/>
+          </a:fillRef>
+          <a:effectRef idx="0">
+            <a:schemeClr val="accent1"/>
+          </a:effectRef>
+          <a:fontRef idx="minor">
+            <a:schemeClr val="lt1"/>
+          </a:fontRef>
+        </p:style>
+        <p:txBody>
+          <a:bodyPr rtlCol="0" anchor="ctr"/>
+          <a:lstStyle/>
+          <a:p>
+            <a:pPr algn="ctr"/>
+            <a:r>
+              <a:rPr lang="en-CA" sz="1400" b="1" dirty="0"/>
+              <a:t>Federal Government (Ottawa)</a:t>
+            </a:r>
+          </a:p>
+        </p:txBody>
+      </p:sp>
+      <p:sp>
+        <p:nvSpPr>
+          <p:cNvPr id="6" name="Rectangle 5">
+            <a:extLst>
+              <a:ext uri="{FF2B5EF4-FFF2-40B4-BE49-F238E27FC236}">
+                <a16:creationId xmlns:a16="http://schemas.microsoft.com/office/drawing/2014/main" id="{AF86E7C0-1A96-4461-9AA4-FCFF338FCA8F}"/>
+              </a:ext>
+            </a:extLst>
+          </p:cNvPr>
+          <p:cNvSpPr/>
+          <p:nvPr/>
+        </p:nvSpPr>
+        <p:spPr>
+          <a:xfrm>
+            <a:off x="61724" y="4148155"/>
+            <a:ext cx="3448993" cy="623320"/>
+          </a:xfrm>
+          <a:prstGeom prst="rect">
+            <a:avLst/>
+          </a:prstGeom>
+          <a:solidFill>
+            <a:srgbClr val="006C31"/>
+          </a:solidFill>
+          <a:ln>
+            <a:noFill/>
+          </a:ln>
+        </p:spPr>
+        <p:style>
+          <a:lnRef idx="2">
+            <a:schemeClr val="accent1">
+              <a:shade val="50000"/>
+            </a:schemeClr>
+          </a:lnRef>
+          <a:fillRef idx="1">
+            <a:schemeClr val="accent1"/>
+          </a:fillRef>
+          <a:effectRef idx="0">
+            <a:schemeClr val="accent1"/>
+          </a:effectRef>
+          <a:fontRef idx="minor">
+            <a:schemeClr val="lt1"/>
+          </a:fontRef>
+        </p:style>
+        <p:txBody>
+          <a:bodyPr rtlCol="0" anchor="ctr"/>
+          <a:lstStyle/>
+          <a:p>
+            <a:pPr algn="ctr"/>
+            <a:r>
+              <a:rPr lang="en-CA" sz="1400" b="1" dirty="0"/>
+              <a:t>Ontario Provincial Government </a:t>
+            </a:r>
+          </a:p>
+          <a:p>
+            <a:pPr algn="ctr"/>
+            <a:r>
+              <a:rPr lang="en-CA" sz="1400" b="1" dirty="0"/>
+              <a:t>(Toronto)</a:t>
+            </a:r>
+          </a:p>
+        </p:txBody>
+      </p:sp>
+      <p:sp>
+        <p:nvSpPr>
+          <p:cNvPr id="7" name="Rectangle 6">
+            <a:extLst>
+              <a:ext uri="{FF2B5EF4-FFF2-40B4-BE49-F238E27FC236}">
+                <a16:creationId xmlns:a16="http://schemas.microsoft.com/office/drawing/2014/main" id="{BBD7F38E-C0DC-4DF0-84E9-4613F6ACBF42}"/>
+              </a:ext>
+            </a:extLst>
+          </p:cNvPr>
+          <p:cNvSpPr/>
+          <p:nvPr/>
+        </p:nvSpPr>
+        <p:spPr>
+          <a:xfrm>
+            <a:off x="3681350" y="4148155"/>
+            <a:ext cx="3448993" cy="623320"/>
+          </a:xfrm>
+          <a:prstGeom prst="rect">
+            <a:avLst/>
+          </a:prstGeom>
+          <a:solidFill>
+            <a:srgbClr val="006C31"/>
+          </a:solidFill>
+          <a:ln>
+            <a:noFill/>
+          </a:ln>
+        </p:spPr>
+        <p:style>
+          <a:lnRef idx="2">
+            <a:schemeClr val="accent1">
+              <a:shade val="50000"/>
+            </a:schemeClr>
+          </a:lnRef>
+          <a:fillRef idx="1">
+            <a:schemeClr val="accent1"/>
+          </a:fillRef>
+          <a:effectRef idx="0">
+            <a:schemeClr val="accent1"/>
+          </a:effectRef>
+          <a:fontRef idx="minor">
+            <a:schemeClr val="lt1"/>
+          </a:fontRef>
+        </p:style>
+        <p:txBody>
+          <a:bodyPr rtlCol="0" anchor="ctr"/>
+          <a:lstStyle/>
+          <a:p>
+            <a:pPr algn="ctr"/>
+            <a:r>
+              <a:rPr lang="en-CA" sz="1400" b="1" dirty="0"/>
+              <a:t>Quebec Provincial Government </a:t>
+            </a:r>
+          </a:p>
+          <a:p>
+            <a:pPr algn="ctr"/>
+            <a:r>
+              <a:rPr lang="en-CA" sz="1400" b="1" dirty="0"/>
+              <a:t>(City of Quebec)</a:t>
+            </a:r>
+          </a:p>
+        </p:txBody>
+      </p:sp>
+      <p:sp>
+        <p:nvSpPr>
+          <p:cNvPr id="8" name="Rectangle 7">
+            <a:extLst>
+              <a:ext uri="{FF2B5EF4-FFF2-40B4-BE49-F238E27FC236}">
+                <a16:creationId xmlns:a16="http://schemas.microsoft.com/office/drawing/2014/main" id="{7046BCB6-EF70-416D-B5D2-D653829C2B07}"/>
+              </a:ext>
+            </a:extLst>
+          </p:cNvPr>
+          <p:cNvSpPr/>
+          <p:nvPr/>
+        </p:nvSpPr>
+        <p:spPr>
+          <a:xfrm>
+            <a:off x="7300976" y="4148155"/>
+            <a:ext cx="3448993" cy="623320"/>
+          </a:xfrm>
+          <a:prstGeom prst="rect">
+            <a:avLst/>
+          </a:prstGeom>
+          <a:solidFill>
+            <a:srgbClr val="006C31"/>
+          </a:solidFill>
+          <a:ln>
+            <a:noFill/>
+          </a:ln>
+        </p:spPr>
+        <p:style>
+          <a:lnRef idx="2">
+            <a:schemeClr val="accent1">
+              <a:shade val="50000"/>
+            </a:schemeClr>
+          </a:lnRef>
+          <a:fillRef idx="1">
+            <a:schemeClr val="accent1"/>
+          </a:fillRef>
+          <a:effectRef idx="0">
+            <a:schemeClr val="accent1"/>
+          </a:effectRef>
+          <a:fontRef idx="minor">
+            <a:schemeClr val="lt1"/>
+          </a:fontRef>
+        </p:style>
+        <p:txBody>
+          <a:bodyPr rtlCol="0" anchor="ctr"/>
+          <a:lstStyle/>
+          <a:p>
+            <a:pPr algn="ctr"/>
+            <a:r>
+              <a:rPr lang="en-CA" sz="1400" b="1" dirty="0"/>
+              <a:t>New Brunswick Provincial Government</a:t>
+            </a:r>
+          </a:p>
+          <a:p>
+            <a:pPr algn="ctr"/>
+            <a:r>
+              <a:rPr lang="en-CA" sz="1400" b="1" dirty="0"/>
+              <a:t>(Fredericton)</a:t>
+            </a:r>
+          </a:p>
+        </p:txBody>
+      </p:sp>
+      <p:sp>
+        <p:nvSpPr>
+          <p:cNvPr id="9" name="Rectangle 8">
+            <a:extLst>
+              <a:ext uri="{FF2B5EF4-FFF2-40B4-BE49-F238E27FC236}">
+                <a16:creationId xmlns:a16="http://schemas.microsoft.com/office/drawing/2014/main" id="{E38A25D2-9C55-4A30-B93D-562139B1B346}"/>
+              </a:ext>
+            </a:extLst>
+          </p:cNvPr>
+          <p:cNvSpPr/>
+          <p:nvPr/>
+        </p:nvSpPr>
+        <p:spPr>
+          <a:xfrm>
+            <a:off x="10920602" y="4148155"/>
+            <a:ext cx="3448993" cy="623320"/>
+          </a:xfrm>
+          <a:prstGeom prst="rect">
+            <a:avLst/>
+          </a:prstGeom>
+          <a:solidFill>
+            <a:srgbClr val="006C31"/>
+          </a:solidFill>
+          <a:ln>
+            <a:noFill/>
+          </a:ln>
+        </p:spPr>
+        <p:style>
+          <a:lnRef idx="2">
+            <a:schemeClr val="accent1">
+              <a:shade val="50000"/>
+            </a:schemeClr>
+          </a:lnRef>
+          <a:fillRef idx="1">
+            <a:schemeClr val="accent1"/>
+          </a:fillRef>
+          <a:effectRef idx="0">
+            <a:schemeClr val="accent1"/>
+          </a:effectRef>
+          <a:fontRef idx="minor">
+            <a:schemeClr val="lt1"/>
+          </a:fontRef>
+        </p:style>
+        <p:txBody>
+          <a:bodyPr rtlCol="0" anchor="ctr"/>
+          <a:lstStyle/>
+          <a:p>
+            <a:pPr algn="ctr"/>
+            <a:r>
+              <a:rPr lang="en-CA" sz="1400" b="1" dirty="0"/>
+              <a:t>Nova Scotia Provincial Government</a:t>
+            </a:r>
+          </a:p>
+          <a:p>
+            <a:pPr algn="ctr"/>
+            <a:r>
+              <a:rPr lang="en-CA" sz="1400" b="1" dirty="0"/>
+              <a:t>(Halifax)</a:t>
+            </a:r>
+          </a:p>
+        </p:txBody>
+      </p:sp>
+      <p:cxnSp>
+        <p:nvCxnSpPr>
+          <p:cNvPr id="15" name="Straight Connector 14">
+            <a:extLst>
+              <a:ext uri="{FF2B5EF4-FFF2-40B4-BE49-F238E27FC236}">
+                <a16:creationId xmlns:a16="http://schemas.microsoft.com/office/drawing/2014/main" id="{94E1A1AE-6F9A-4C7F-85BD-FA17A5D03FEE}"/>
+              </a:ext>
+            </a:extLst>
+          </p:cNvPr>
+          <p:cNvCxnSpPr>
+            <a:cxnSpLocks/>
+            <a:stCxn id="5" idx="2"/>
+            <a:endCxn id="7" idx="0"/>
+          </p:cNvCxnSpPr>
+          <p:nvPr/>
+        </p:nvCxnSpPr>
+        <p:spPr>
+          <a:xfrm flipH="1">
+            <a:off x="5405847" y="3512392"/>
+            <a:ext cx="1794259" cy="635763"/>
+          </a:xfrm>
+          <a:prstGeom prst="line">
+            <a:avLst/>
+          </a:prstGeom>
+          <a:ln w="19050">
+            <a:solidFill>
+              <a:schemeClr val="tx1"/>
+            </a:solidFill>
+          </a:ln>
+        </p:spPr>
+        <p:style>
+          <a:lnRef idx="1">
+            <a:schemeClr val="accent1"/>
+          </a:lnRef>
+          <a:fillRef idx="0">
+            <a:schemeClr val="accent1"/>
+          </a:fillRef>
+          <a:effectRef idx="0">
+            <a:schemeClr val="accent1"/>
+          </a:effectRef>
+          <a:fontRef idx="minor">
+            <a:schemeClr val="tx1"/>
+          </a:fontRef>
+        </p:style>
+      </p:cxnSp>
+      <p:cxnSp>
+        <p:nvCxnSpPr>
+          <p:cNvPr id="18" name="Straight Connector 17">
+            <a:extLst>
+              <a:ext uri="{FF2B5EF4-FFF2-40B4-BE49-F238E27FC236}">
+                <a16:creationId xmlns:a16="http://schemas.microsoft.com/office/drawing/2014/main" id="{5367DD8B-EDF3-4587-9643-55FDBFEC084F}"/>
+              </a:ext>
+            </a:extLst>
+          </p:cNvPr>
+          <p:cNvCxnSpPr>
+            <a:cxnSpLocks/>
+            <a:stCxn id="5" idx="2"/>
+            <a:endCxn id="8" idx="0"/>
+          </p:cNvCxnSpPr>
+          <p:nvPr/>
+        </p:nvCxnSpPr>
+        <p:spPr>
+          <a:xfrm>
+            <a:off x="7200106" y="3512392"/>
+            <a:ext cx="1825367" cy="635763"/>
+          </a:xfrm>
+          <a:prstGeom prst="line">
+            <a:avLst/>
+          </a:prstGeom>
+          <a:ln w="19050">
+            <a:solidFill>
+              <a:schemeClr val="tx1"/>
+            </a:solidFill>
+          </a:ln>
+        </p:spPr>
+        <p:style>
+          <a:lnRef idx="1">
+            <a:schemeClr val="accent1"/>
+          </a:lnRef>
+          <a:fillRef idx="0">
+            <a:schemeClr val="accent1"/>
+          </a:fillRef>
+          <a:effectRef idx="0">
+            <a:schemeClr val="accent1"/>
+          </a:effectRef>
+          <a:fontRef idx="minor">
+            <a:schemeClr val="tx1"/>
+          </a:fontRef>
+        </p:style>
+      </p:cxnSp>
+      <p:cxnSp>
+        <p:nvCxnSpPr>
+          <p:cNvPr id="21" name="Straight Connector 20">
+            <a:extLst>
+              <a:ext uri="{FF2B5EF4-FFF2-40B4-BE49-F238E27FC236}">
+                <a16:creationId xmlns:a16="http://schemas.microsoft.com/office/drawing/2014/main" id="{58CBD94A-C0B9-4A70-A5D0-2888362F2B64}"/>
+              </a:ext>
+            </a:extLst>
+          </p:cNvPr>
+          <p:cNvCxnSpPr>
+            <a:cxnSpLocks/>
+            <a:stCxn id="5" idx="2"/>
+            <a:endCxn id="9" idx="0"/>
+          </p:cNvCxnSpPr>
+          <p:nvPr/>
+        </p:nvCxnSpPr>
+        <p:spPr>
+          <a:xfrm>
+            <a:off x="7200106" y="3512392"/>
+            <a:ext cx="5444993" cy="635763"/>
+          </a:xfrm>
+          <a:prstGeom prst="line">
+            <a:avLst/>
+          </a:prstGeom>
+          <a:ln w="19050">
+            <a:solidFill>
+              <a:schemeClr val="tx1"/>
+            </a:solidFill>
+          </a:ln>
+        </p:spPr>
+        <p:style>
+          <a:lnRef idx="1">
+            <a:schemeClr val="accent1"/>
+          </a:lnRef>
+          <a:fillRef idx="0">
+            <a:schemeClr val="accent1"/>
+          </a:fillRef>
+          <a:effectRef idx="0">
+            <a:schemeClr val="accent1"/>
+          </a:effectRef>
+          <a:fontRef idx="minor">
+            <a:schemeClr val="tx1"/>
+          </a:fontRef>
+        </p:style>
+      </p:cxnSp>
+    </p:spTree>
+    <p:extLst>
+      <p:ext uri="{BB962C8B-B14F-4D97-AF65-F5344CB8AC3E}">
+        <p14:creationId xmlns:p14="http://schemas.microsoft.com/office/powerpoint/2010/main" val="1526698822"/>
+      </p:ext>
+    </p:extLst>
+  </p:cSld>
+  <p:clrMapOvr>
+    <a:masterClrMapping/>
+  </p:clrMapOvr>
+</p:sld>
+</file>
+
 <file path=ppt/theme/theme1.xml><?xml version="1.0" encoding="utf-8"?>
 <a:theme xmlns:a="http://schemas.openxmlformats.org/drawingml/2006/main" name="Office Theme">
   <a:themeElements>

</xml_diff>